<commit_message>
add lect 3 pptx
</commit_message>
<xml_diff>
--- a/lectures/03-evol.pptx
+++ b/lectures/03-evol.pptx
@@ -250,7 +250,7 @@
           <a:p>
             <a:fld id="{0F9C1CCF-B725-44A7-AA57-5E433BD85C9F}" type="datetimeFigureOut">
               <a:rPr lang="en-US" smtClean="0"/>
-              <a:t>1/23/23</a:t>
+              <a:t>1/25/23</a:t>
             </a:fld>
             <a:endParaRPr lang="en-US"/>
           </a:p>
@@ -561,7 +561,7 @@
           <a:bodyPr/>
           <a:lstStyle/>
           <a:p>
-            <a:endParaRPr lang="en-US"/>
+            <a:endParaRPr lang="en-US" dirty="0"/>
           </a:p>
         </p:txBody>
       </p:sp>
@@ -4532,7 +4532,7 @@
           <a:p>
             <a:fld id="{241EB5C9-1307-BA42-ABA2-0BC069CD8E7F}" type="datetimeFigureOut">
               <a:rPr lang="en-US" smtClean="0"/>
-              <a:t>1/23/23</a:t>
+              <a:t>1/25/23</a:t>
             </a:fld>
             <a:endParaRPr lang="en-US"/>
           </a:p>
@@ -4710,7 +4710,7 @@
           <a:p>
             <a:fld id="{241EB5C9-1307-BA42-ABA2-0BC069CD8E7F}" type="datetimeFigureOut">
               <a:rPr lang="en-US" smtClean="0"/>
-              <a:t>1/23/23</a:t>
+              <a:t>1/25/23</a:t>
             </a:fld>
             <a:endParaRPr lang="en-US"/>
           </a:p>
@@ -4888,7 +4888,7 @@
           <a:p>
             <a:fld id="{241EB5C9-1307-BA42-ABA2-0BC069CD8E7F}" type="datetimeFigureOut">
               <a:rPr lang="en-US" smtClean="0"/>
-              <a:t>1/23/23</a:t>
+              <a:t>1/25/23</a:t>
             </a:fld>
             <a:endParaRPr lang="en-US"/>
           </a:p>
@@ -5147,7 +5147,7 @@
           <a:p>
             <a:fld id="{241EB5C9-1307-BA42-ABA2-0BC069CD8E7F}" type="datetimeFigureOut">
               <a:rPr lang="en-US" smtClean="0"/>
-              <a:t>1/23/23</a:t>
+              <a:t>1/25/23</a:t>
             </a:fld>
             <a:endParaRPr lang="en-US"/>
           </a:p>
@@ -5442,7 +5442,7 @@
           <a:p>
             <a:fld id="{241EB5C9-1307-BA42-ABA2-0BC069CD8E7F}" type="datetimeFigureOut">
               <a:rPr lang="en-US" smtClean="0"/>
-              <a:t>1/23/23</a:t>
+              <a:t>1/25/23</a:t>
             </a:fld>
             <a:endParaRPr lang="en-US"/>
           </a:p>
@@ -5867,7 +5867,7 @@
           <a:p>
             <a:fld id="{241EB5C9-1307-BA42-ABA2-0BC069CD8E7F}" type="datetimeFigureOut">
               <a:rPr lang="en-US" smtClean="0"/>
-              <a:t>1/23/23</a:t>
+              <a:t>1/25/23</a:t>
             </a:fld>
             <a:endParaRPr lang="en-US"/>
           </a:p>
@@ -5994,7 +5994,7 @@
           <a:p>
             <a:fld id="{241EB5C9-1307-BA42-ABA2-0BC069CD8E7F}" type="datetimeFigureOut">
               <a:rPr lang="en-US" smtClean="0"/>
-              <a:t>1/23/23</a:t>
+              <a:t>1/25/23</a:t>
             </a:fld>
             <a:endParaRPr lang="en-US"/>
           </a:p>
@@ -6089,7 +6089,7 @@
           <a:p>
             <a:fld id="{241EB5C9-1307-BA42-ABA2-0BC069CD8E7F}" type="datetimeFigureOut">
               <a:rPr lang="en-US" smtClean="0"/>
-              <a:t>1/23/23</a:t>
+              <a:t>1/25/23</a:t>
             </a:fld>
             <a:endParaRPr lang="en-US"/>
           </a:p>
@@ -6370,7 +6370,7 @@
           <a:p>
             <a:fld id="{241EB5C9-1307-BA42-ABA2-0BC069CD8E7F}" type="datetimeFigureOut">
               <a:rPr lang="en-US" smtClean="0"/>
-              <a:t>1/23/23</a:t>
+              <a:t>1/25/23</a:t>
             </a:fld>
             <a:endParaRPr lang="en-US"/>
           </a:p>
@@ -6622,7 +6622,7 @@
           <a:p>
             <a:fld id="{241EB5C9-1307-BA42-ABA2-0BC069CD8E7F}" type="datetimeFigureOut">
               <a:rPr lang="en-US" smtClean="0"/>
-              <a:t>1/23/23</a:t>
+              <a:t>1/25/23</a:t>
             </a:fld>
             <a:endParaRPr lang="en-US"/>
           </a:p>
@@ -6833,7 +6833,7 @@
           <a:p>
             <a:fld id="{241EB5C9-1307-BA42-ABA2-0BC069CD8E7F}" type="datetimeFigureOut">
               <a:rPr lang="en-US" smtClean="0"/>
-              <a:t>1/23/23</a:t>
+              <a:t>1/25/23</a:t>
             </a:fld>
             <a:endParaRPr lang="en-US"/>
           </a:p>
@@ -9384,26 +9384,35 @@
           <a:p>
             <a:pPr lvl="0"/>
             <a:r>
-              <a:rPr b="1"/>
+              <a:rPr b="1" dirty="0"/>
               <a:t>The Great Broadening</a:t>
             </a:r>
           </a:p>
           <a:p>
             <a:pPr lvl="1"/>
             <a:r>
+              <a:rPr dirty="0"/>
               <a:t>Increase in government and policy in more areas of society</a:t>
             </a:r>
+            <a:endParaRPr lang="en-US" dirty="0"/>
+          </a:p>
+          <a:p>
+            <a:pPr marL="342900" lvl="1" indent="0">
+              <a:buNone/>
+            </a:pPr>
+            <a:endParaRPr dirty="0"/>
           </a:p>
           <a:p>
             <a:pPr lvl="0"/>
             <a:r>
-              <a:rPr b="1"/>
+              <a:rPr b="1" dirty="0"/>
               <a:t>Ecology</a:t>
             </a:r>
           </a:p>
           <a:p>
             <a:pPr lvl="1"/>
             <a:r>
+              <a:rPr dirty="0"/>
               <a:t>Nature is a system based on interdependence and stability</a:t>
             </a:r>
           </a:p>
@@ -9548,7 +9557,7 @@
                                         <p:tgtEl>
                                           <p:spTgt spid="3">
                                             <p:txEl>
-                                              <p:pRg st="2" end="2"/>
+                                              <p:pRg st="3" end="3"/>
                                             </p:txEl>
                                           </p:spTgt>
                                         </p:tgtEl>
@@ -9597,7 +9606,7 @@
                                         <p:tgtEl>
                                           <p:spTgt spid="3">
                                             <p:txEl>
-                                              <p:pRg st="3" end="3"/>
+                                              <p:pRg st="4" end="4"/>
                                             </p:txEl>
                                           </p:spTgt>
                                         </p:tgtEl>

</xml_diff>